<commit_message>
Fix i PPn och genereringsskriptet
</commit_message>
<xml_diff>
--- a/Kafka Summit-part1-v07.pptx
+++ b/Kafka Summit-part1-v07.pptx
@@ -18291,7 +18291,7 @@
         </p:blipFill>
         <p:spPr>
           <a:xfrm>
-            <a:off x="6303329" y="1271591"/>
+            <a:off x="6392229" y="1585914"/>
             <a:ext cx="4589141" cy="2413000"/>
           </a:xfrm>
           <a:prstGeom prst="rect">
@@ -18307,7 +18307,7 @@
         </p:nvCxnSpPr>
         <p:spPr>
           <a:xfrm flipV="1">
-            <a:off x="7556500" y="1766090"/>
+            <a:off x="7645400" y="2080413"/>
             <a:ext cx="850900" cy="1066010"/>
           </a:xfrm>
           <a:prstGeom prst="straightConnector1">
@@ -18341,7 +18341,7 @@
         </p:nvCxnSpPr>
         <p:spPr>
           <a:xfrm flipV="1">
-            <a:off x="6921500" y="1677976"/>
+            <a:off x="7010400" y="1992299"/>
             <a:ext cx="1485900" cy="328624"/>
           </a:xfrm>
           <a:prstGeom prst="straightConnector1">
@@ -18375,7 +18375,7 @@
         </p:nvCxnSpPr>
         <p:spPr>
           <a:xfrm flipH="1" flipV="1">
-            <a:off x="8509000" y="1677976"/>
+            <a:off x="8597900" y="1992299"/>
             <a:ext cx="1358900" cy="693750"/>
           </a:xfrm>
           <a:prstGeom prst="straightConnector1">
@@ -18409,7 +18409,7 @@
         </p:nvCxnSpPr>
         <p:spPr>
           <a:xfrm flipH="1" flipV="1">
-            <a:off x="8509000" y="1766090"/>
+            <a:off x="8597900" y="2080413"/>
             <a:ext cx="203200" cy="915194"/>
           </a:xfrm>
           <a:prstGeom prst="straightConnector1">
@@ -20642,7 +20642,7 @@
         </p:blipFill>
         <p:spPr>
           <a:xfrm>
-            <a:off x="4596166" y="968752"/>
+            <a:off x="4411544" y="976311"/>
             <a:ext cx="1716978" cy="1716978"/>
           </a:xfrm>
           <a:prstGeom prst="rect">
@@ -20650,6 +20650,48 @@
           </a:prstGeom>
         </p:spPr>
       </p:pic>
+      <p:sp>
+        <p:nvSpPr>
+          <p:cNvPr id="4" name="Rektangel 3"/>
+          <p:cNvSpPr/>
+          <p:nvPr/>
+        </p:nvSpPr>
+        <p:spPr>
+          <a:xfrm>
+            <a:off x="1079500" y="1422400"/>
+            <a:ext cx="8793192" cy="4140199"/>
+          </a:xfrm>
+          <a:prstGeom prst="rect">
+            <a:avLst/>
+          </a:prstGeom>
+          <a:noFill/>
+          <a:ln w="41275"/>
+        </p:spPr>
+        <p:style>
+          <a:lnRef idx="2">
+            <a:schemeClr val="accent1">
+              <a:shade val="50000"/>
+            </a:schemeClr>
+          </a:lnRef>
+          <a:fillRef idx="1">
+            <a:schemeClr val="accent1"/>
+          </a:fillRef>
+          <a:effectRef idx="0">
+            <a:schemeClr val="accent1"/>
+          </a:effectRef>
+          <a:fontRef idx="minor">
+            <a:schemeClr val="lt1"/>
+          </a:fontRef>
+        </p:style>
+        <p:txBody>
+          <a:bodyPr rtlCol="0" anchor="ctr"/>
+          <a:lstStyle/>
+          <a:p>
+            <a:pPr algn="ctr"/>
+            <a:endParaRPr lang="sv-SE"/>
+          </a:p>
+        </p:txBody>
+      </p:sp>
       <p:sp>
         <p:nvSpPr>
           <p:cNvPr id="5" name="Platshållare för innehåll 2"/>
@@ -21087,7 +21129,15 @@
                   <a:schemeClr val="tx1"/>
                 </a:solidFill>
               </a:rPr>
-              <a:t>Transactions</a:t>
+              <a:t>Customer</a:t>
+            </a:r>
+            <a:r>
+              <a:rPr lang="sv-SE" dirty="0" smtClean="0">
+                <a:solidFill>
+                  <a:schemeClr val="tx1"/>
+                </a:solidFill>
+              </a:rPr>
+              <a:t> events</a:t>
             </a:r>
             <a:endParaRPr lang="sv-SE" dirty="0">
               <a:solidFill>
@@ -21669,48 +21719,6 @@
               <a:t>25</a:t>
             </a:fld>
             <a:endParaRPr lang="en-US"/>
-          </a:p>
-        </p:txBody>
-      </p:sp>
-      <p:sp>
-        <p:nvSpPr>
-          <p:cNvPr id="4" name="Rektangel 3"/>
-          <p:cNvSpPr/>
-          <p:nvPr/>
-        </p:nvSpPr>
-        <p:spPr>
-          <a:xfrm>
-            <a:off x="1079500" y="1422400"/>
-            <a:ext cx="8793192" cy="4140199"/>
-          </a:xfrm>
-          <a:prstGeom prst="rect">
-            <a:avLst/>
-          </a:prstGeom>
-          <a:noFill/>
-          <a:ln w="41275"/>
-        </p:spPr>
-        <p:style>
-          <a:lnRef idx="2">
-            <a:schemeClr val="accent1">
-              <a:shade val="50000"/>
-            </a:schemeClr>
-          </a:lnRef>
-          <a:fillRef idx="1">
-            <a:schemeClr val="accent1"/>
-          </a:fillRef>
-          <a:effectRef idx="0">
-            <a:schemeClr val="accent1"/>
-          </a:effectRef>
-          <a:fontRef idx="minor">
-            <a:schemeClr val="lt1"/>
-          </a:fontRef>
-        </p:style>
-        <p:txBody>
-          <a:bodyPr rtlCol="0" anchor="ctr"/>
-          <a:lstStyle/>
-          <a:p>
-            <a:pPr algn="ctr"/>
-            <a:endParaRPr lang="sv-SE"/>
           </a:p>
         </p:txBody>
       </p:sp>

</xml_diff>